<commit_message>
updated asymptotic analysis lecture
</commit_message>
<xml_diff>
--- a/slides/asymptotic_analysis.pptx
+++ b/slides/asymptotic_analysis.pptx
@@ -5,7 +5,7 @@
     <p:sldMasterId id="2147483648" r:id="rId1"/>
   </p:sldMasterIdLst>
   <p:notesMasterIdLst>
-    <p:notesMasterId r:id="rId42"/>
+    <p:notesMasterId r:id="rId41"/>
   </p:notesMasterIdLst>
   <p:sldIdLst>
     <p:sldId id="613" r:id="rId2"/>
@@ -39,15 +39,14 @@
     <p:sldId id="437" r:id="rId30"/>
     <p:sldId id="438" r:id="rId31"/>
     <p:sldId id="424" r:id="rId32"/>
-    <p:sldId id="425" r:id="rId33"/>
-    <p:sldId id="426" r:id="rId34"/>
-    <p:sldId id="427" r:id="rId35"/>
-    <p:sldId id="428" r:id="rId36"/>
-    <p:sldId id="432" r:id="rId37"/>
-    <p:sldId id="433" r:id="rId38"/>
-    <p:sldId id="434" r:id="rId39"/>
-    <p:sldId id="435" r:id="rId40"/>
-    <p:sldId id="619" r:id="rId41"/>
+    <p:sldId id="426" r:id="rId33"/>
+    <p:sldId id="427" r:id="rId34"/>
+    <p:sldId id="428" r:id="rId35"/>
+    <p:sldId id="432" r:id="rId36"/>
+    <p:sldId id="433" r:id="rId37"/>
+    <p:sldId id="434" r:id="rId38"/>
+    <p:sldId id="435" r:id="rId39"/>
+    <p:sldId id="619" r:id="rId40"/>
   </p:sldIdLst>
   <p:sldSz cx="12192000" cy="6858000"/>
   <p:notesSz cx="6858000" cy="9144000"/>
@@ -2846,7 +2845,7 @@
       </p:grpSpPr>
       <p:sp>
         <p:nvSpPr>
-          <p:cNvPr id="113666" name="Slide Image Placeholder 1"/>
+          <p:cNvPr id="114690" name="Slide Image Placeholder 1"/>
           <p:cNvSpPr>
             <a:spLocks noGrp="1" noRot="1" noChangeAspect="1" noTextEdit="1"/>
           </p:cNvSpPr>
@@ -2868,7 +2867,7 @@
       </p:sp>
       <p:sp>
         <p:nvSpPr>
-          <p:cNvPr id="113667" name="Notes Placeholder 2"/>
+          <p:cNvPr id="114691" name="Notes Placeholder 2"/>
           <p:cNvSpPr>
             <a:spLocks noGrp="1"/>
           </p:cNvSpPr>
@@ -2909,7 +2908,7 @@
             <a:pPr>
               <a:defRPr/>
             </a:pPr>
-            <a:fld id="{95D1605D-9E73-48C6-B145-0430DE70B250}" type="slidenum">
+            <a:fld id="{99169D27-A329-41BF-8842-676EB73F498E}" type="slidenum">
               <a:rPr lang="en-CA" smtClean="0"/>
               <a:pPr>
                 <a:defRPr/>
@@ -2947,7 +2946,7 @@
       </p:grpSpPr>
       <p:sp>
         <p:nvSpPr>
-          <p:cNvPr id="114690" name="Slide Image Placeholder 1"/>
+          <p:cNvPr id="115714" name="Slide Image Placeholder 1"/>
           <p:cNvSpPr>
             <a:spLocks noGrp="1" noRot="1" noChangeAspect="1" noTextEdit="1"/>
           </p:cNvSpPr>
@@ -2969,7 +2968,7 @@
       </p:sp>
       <p:sp>
         <p:nvSpPr>
-          <p:cNvPr id="114691" name="Notes Placeholder 2"/>
+          <p:cNvPr id="115715" name="Notes Placeholder 2"/>
           <p:cNvSpPr>
             <a:spLocks noGrp="1"/>
           </p:cNvSpPr>
@@ -3010,7 +3009,7 @@
             <a:pPr>
               <a:defRPr/>
             </a:pPr>
-            <a:fld id="{99169D27-A329-41BF-8842-676EB73F498E}" type="slidenum">
+            <a:fld id="{A14DD6F6-173E-45D3-A324-05FFF903804B}" type="slidenum">
               <a:rPr lang="en-CA" smtClean="0"/>
               <a:pPr>
                 <a:defRPr/>
@@ -3048,7 +3047,7 @@
       </p:grpSpPr>
       <p:sp>
         <p:nvSpPr>
-          <p:cNvPr id="115714" name="Slide Image Placeholder 1"/>
+          <p:cNvPr id="116738" name="Slide Image Placeholder 1"/>
           <p:cNvSpPr>
             <a:spLocks noGrp="1" noRot="1" noChangeAspect="1" noTextEdit="1"/>
           </p:cNvSpPr>
@@ -3070,7 +3069,7 @@
       </p:sp>
       <p:sp>
         <p:nvSpPr>
-          <p:cNvPr id="115715" name="Notes Placeholder 2"/>
+          <p:cNvPr id="116739" name="Notes Placeholder 2"/>
           <p:cNvSpPr>
             <a:spLocks noGrp="1"/>
           </p:cNvSpPr>
@@ -3111,7 +3110,7 @@
             <a:pPr>
               <a:defRPr/>
             </a:pPr>
-            <a:fld id="{A14DD6F6-173E-45D3-A324-05FFF903804B}" type="slidenum">
+            <a:fld id="{B60DE84F-A258-48D6-955F-2032494CFF0C}" type="slidenum">
               <a:rPr lang="en-CA" smtClean="0"/>
               <a:pPr>
                 <a:defRPr/>
@@ -3149,7 +3148,7 @@
       </p:grpSpPr>
       <p:sp>
         <p:nvSpPr>
-          <p:cNvPr id="116738" name="Slide Image Placeholder 1"/>
+          <p:cNvPr id="120834" name="Slide Image Placeholder 1"/>
           <p:cNvSpPr>
             <a:spLocks noGrp="1" noRot="1" noChangeAspect="1" noTextEdit="1"/>
           </p:cNvSpPr>
@@ -3171,7 +3170,7 @@
       </p:sp>
       <p:sp>
         <p:nvSpPr>
-          <p:cNvPr id="116739" name="Notes Placeholder 2"/>
+          <p:cNvPr id="120835" name="Notes Placeholder 2"/>
           <p:cNvSpPr>
             <a:spLocks noGrp="1"/>
           </p:cNvSpPr>
@@ -3212,7 +3211,7 @@
             <a:pPr>
               <a:defRPr/>
             </a:pPr>
-            <a:fld id="{B60DE84F-A258-48D6-955F-2032494CFF0C}" type="slidenum">
+            <a:fld id="{AC44E34E-8F37-46EE-B6C8-3AAD60642FCD}" type="slidenum">
               <a:rPr lang="en-CA" smtClean="0"/>
               <a:pPr>
                 <a:defRPr/>
@@ -3250,7 +3249,7 @@
       </p:grpSpPr>
       <p:sp>
         <p:nvSpPr>
-          <p:cNvPr id="120834" name="Slide Image Placeholder 1"/>
+          <p:cNvPr id="121858" name="Slide Image Placeholder 1"/>
           <p:cNvSpPr>
             <a:spLocks noGrp="1" noRot="1" noChangeAspect="1" noTextEdit="1"/>
           </p:cNvSpPr>
@@ -3272,7 +3271,7 @@
       </p:sp>
       <p:sp>
         <p:nvSpPr>
-          <p:cNvPr id="120835" name="Notes Placeholder 2"/>
+          <p:cNvPr id="121859" name="Notes Placeholder 2"/>
           <p:cNvSpPr>
             <a:spLocks noGrp="1"/>
           </p:cNvSpPr>
@@ -3313,12 +3312,12 @@
             <a:pPr>
               <a:defRPr/>
             </a:pPr>
-            <a:fld id="{AC44E34E-8F37-46EE-B6C8-3AAD60642FCD}" type="slidenum">
+            <a:fld id="{E931DA3C-2231-44C8-B4BA-E8D69011C6D5}" type="slidenum">
               <a:rPr lang="en-CA" smtClean="0"/>
               <a:pPr>
                 <a:defRPr/>
               </a:pPr>
-              <a:t>36</a:t>
+              <a:t>37</a:t>
             </a:fld>
             <a:endParaRPr lang="en-CA"/>
           </a:p>
@@ -3351,7 +3350,7 @@
       </p:grpSpPr>
       <p:sp>
         <p:nvSpPr>
-          <p:cNvPr id="121858" name="Slide Image Placeholder 1"/>
+          <p:cNvPr id="122882" name="Slide Image Placeholder 1"/>
           <p:cNvSpPr>
             <a:spLocks noGrp="1" noRot="1" noChangeAspect="1" noTextEdit="1"/>
           </p:cNvSpPr>
@@ -3373,107 +3372,6 @@
       </p:sp>
       <p:sp>
         <p:nvSpPr>
-          <p:cNvPr id="121859" name="Notes Placeholder 2"/>
-          <p:cNvSpPr>
-            <a:spLocks noGrp="1"/>
-          </p:cNvSpPr>
-          <p:nvPr>
-            <p:ph type="body" idx="1"/>
-          </p:nvPr>
-        </p:nvSpPr>
-        <p:spPr bwMode="auto">
-          <a:noFill/>
-        </p:spPr>
-        <p:txBody>
-          <a:bodyPr wrap="square" numCol="1" anchor="t" anchorCtr="0" compatLnSpc="1">
-            <a:prstTxWarp prst="textNoShape">
-              <a:avLst/>
-            </a:prstTxWarp>
-          </a:bodyPr>
-          <a:lstStyle/>
-          <a:p>
-            <a:endParaRPr lang="en-CA"/>
-          </a:p>
-        </p:txBody>
-      </p:sp>
-      <p:sp>
-        <p:nvSpPr>
-          <p:cNvPr id="4" name="Slide Number Placeholder 3"/>
-          <p:cNvSpPr>
-            <a:spLocks noGrp="1"/>
-          </p:cNvSpPr>
-          <p:nvPr>
-            <p:ph type="sldNum" sz="quarter" idx="5"/>
-          </p:nvPr>
-        </p:nvSpPr>
-        <p:spPr/>
-        <p:txBody>
-          <a:bodyPr/>
-          <a:lstStyle/>
-          <a:p>
-            <a:pPr>
-              <a:defRPr/>
-            </a:pPr>
-            <a:fld id="{E931DA3C-2231-44C8-B4BA-E8D69011C6D5}" type="slidenum">
-              <a:rPr lang="en-CA" smtClean="0"/>
-              <a:pPr>
-                <a:defRPr/>
-              </a:pPr>
-              <a:t>38</a:t>
-            </a:fld>
-            <a:endParaRPr lang="en-CA"/>
-          </a:p>
-        </p:txBody>
-      </p:sp>
-    </p:spTree>
-  </p:cSld>
-  <p:clrMapOvr>
-    <a:masterClrMapping/>
-  </p:clrMapOvr>
-</p:notes>
-</file>
-
-<file path=ppt/notesSlides/notesSlide36.xml><?xml version="1.0" encoding="utf-8"?>
-<p:notes xmlns:a="http://schemas.openxmlformats.org/drawingml/2006/main" xmlns:r="http://schemas.openxmlformats.org/officeDocument/2006/relationships" xmlns:p="http://schemas.openxmlformats.org/presentationml/2006/main">
-  <p:cSld>
-    <p:spTree>
-      <p:nvGrpSpPr>
-        <p:cNvPr id="1" name=""/>
-        <p:cNvGrpSpPr/>
-        <p:nvPr/>
-      </p:nvGrpSpPr>
-      <p:grpSpPr>
-        <a:xfrm>
-          <a:off x="0" y="0"/>
-          <a:ext cx="0" cy="0"/>
-          <a:chOff x="0" y="0"/>
-          <a:chExt cx="0" cy="0"/>
-        </a:xfrm>
-      </p:grpSpPr>
-      <p:sp>
-        <p:nvSpPr>
-          <p:cNvPr id="122882" name="Slide Image Placeholder 1"/>
-          <p:cNvSpPr>
-            <a:spLocks noGrp="1" noRot="1" noChangeAspect="1" noTextEdit="1"/>
-          </p:cNvSpPr>
-          <p:nvPr>
-            <p:ph type="sldImg"/>
-          </p:nvPr>
-        </p:nvSpPr>
-        <p:spPr bwMode="auto">
-          <a:noFill/>
-          <a:ln>
-            <a:solidFill>
-              <a:srgbClr val="000000"/>
-            </a:solidFill>
-            <a:miter lim="800000"/>
-            <a:headEnd/>
-            <a:tailEnd/>
-          </a:ln>
-        </p:spPr>
-      </p:sp>
-      <p:sp>
-        <p:nvSpPr>
           <p:cNvPr id="122883" name="Notes Placeholder 2"/>
           <p:cNvSpPr>
             <a:spLocks noGrp="1"/>
@@ -3520,7 +3418,7 @@
               <a:pPr>
                 <a:defRPr/>
               </a:pPr>
-              <a:t>39</a:t>
+              <a:t>38</a:t>
             </a:fld>
             <a:endParaRPr lang="en-CA"/>
           </a:p>
@@ -8306,7 +8204,7 @@
           <a:graphicData uri="http://schemas.openxmlformats.org/presentationml/2006/ole">
             <mc:AlternateContent xmlns:mc="http://schemas.openxmlformats.org/markup-compatibility/2006">
               <mc:Choice xmlns:v="urn:schemas-microsoft-com:vml" Requires="v">
-                <p:oleObj spid="_x0000_s2080" name="Equation" r:id="rId4" imgW="2387520" imgH="457200" progId="Equation.3">
+                <p:oleObj spid="_x0000_s2084" name="Equation" r:id="rId4" imgW="2387520" imgH="457200" progId="Equation.3">
                   <p:embed/>
                 </p:oleObj>
               </mc:Choice>
@@ -13684,7 +13582,7 @@
       </p:grpSpPr>
       <p:sp>
         <p:nvSpPr>
-          <p:cNvPr id="54274" name="Rectangle 2"/>
+          <p:cNvPr id="55298" name="Rectangle 2"/>
           <p:cNvSpPr>
             <a:spLocks noGrp="1" noChangeArrowheads="1"/>
           </p:cNvSpPr>
@@ -13723,7 +13621,7 @@
       </p:sp>
       <p:sp>
         <p:nvSpPr>
-          <p:cNvPr id="54275" name="Rectangle 3"/>
+          <p:cNvPr id="55299" name="Rectangle 3"/>
           <p:cNvSpPr>
             <a:spLocks noGrp="1" noChangeArrowheads="1"/>
           </p:cNvSpPr>
@@ -13745,14 +13643,228 @@
                 <a:latin typeface="Arial" charset="0"/>
                 <a:cs typeface="Arial" charset="0"/>
               </a:rPr>
-              <a:t>	Recall that with the equivalence class of all 19-year olds, we only had to pick one such student?</a:t>
+              <a:t>	The most common classes are given names:</a:t>
             </a:r>
           </a:p>
           <a:p>
             <a:pPr>
-              <a:buFont typeface="Arial" charset="0"/>
+              <a:buFontTx/>
               <a:buNone/>
             </a:pPr>
+            <a:r>
+              <a:rPr lang="en-US">
+                <a:latin typeface="Arial" charset="0"/>
+                <a:cs typeface="Arial" charset="0"/>
+              </a:rPr>
+              <a:t>		 </a:t>
+            </a:r>
+            <a:r>
+              <a:rPr lang="en-US" b="1">
+                <a:latin typeface="Symbol" pitchFamily="18" charset="2"/>
+                <a:cs typeface="Arial" charset="0"/>
+              </a:rPr>
+              <a:t>Q</a:t>
+            </a:r>
+            <a:r>
+              <a:rPr lang="en-US">
+                <a:latin typeface="Times New Roman" pitchFamily="18" charset="0"/>
+                <a:cs typeface="Arial" charset="0"/>
+              </a:rPr>
+              <a:t>(1)			</a:t>
+            </a:r>
+            <a:r>
+              <a:rPr lang="en-US">
+                <a:latin typeface="Arial" charset="0"/>
+                <a:cs typeface="Arial" charset="0"/>
+              </a:rPr>
+              <a:t>constant</a:t>
+            </a:r>
+          </a:p>
+          <a:p>
+            <a:pPr>
+              <a:buFontTx/>
+              <a:buNone/>
+            </a:pPr>
+            <a:r>
+              <a:rPr lang="en-US">
+                <a:latin typeface="Arial" charset="0"/>
+                <a:cs typeface="Arial" charset="0"/>
+              </a:rPr>
+              <a:t>		 </a:t>
+            </a:r>
+            <a:r>
+              <a:rPr lang="en-US" b="1">
+                <a:latin typeface="Symbol" pitchFamily="18" charset="2"/>
+                <a:cs typeface="Arial" charset="0"/>
+              </a:rPr>
+              <a:t>Q</a:t>
+            </a:r>
+            <a:r>
+              <a:rPr lang="en-US">
+                <a:latin typeface="Times New Roman" pitchFamily="18" charset="0"/>
+                <a:cs typeface="Arial" charset="0"/>
+              </a:rPr>
+              <a:t>(ln(</a:t>
+            </a:r>
+            <a:r>
+              <a:rPr lang="en-US" i="1">
+                <a:latin typeface="Times New Roman" pitchFamily="18" charset="0"/>
+                <a:cs typeface="Arial" charset="0"/>
+              </a:rPr>
+              <a:t>n</a:t>
+            </a:r>
+            <a:r>
+              <a:rPr lang="en-US">
+                <a:latin typeface="Times New Roman" pitchFamily="18" charset="0"/>
+                <a:cs typeface="Arial" charset="0"/>
+              </a:rPr>
+              <a:t>))		</a:t>
+            </a:r>
+            <a:r>
+              <a:rPr lang="en-US">
+                <a:latin typeface="Arial" charset="0"/>
+                <a:cs typeface="Arial" charset="0"/>
+              </a:rPr>
+              <a:t>logarithmic</a:t>
+            </a:r>
+          </a:p>
+          <a:p>
+            <a:pPr>
+              <a:buFontTx/>
+              <a:buNone/>
+            </a:pPr>
+            <a:r>
+              <a:rPr lang="en-US">
+                <a:latin typeface="Arial" charset="0"/>
+                <a:cs typeface="Arial" charset="0"/>
+              </a:rPr>
+              <a:t>		 </a:t>
+            </a:r>
+            <a:r>
+              <a:rPr lang="en-US" b="1">
+                <a:latin typeface="Symbol" pitchFamily="18" charset="2"/>
+                <a:cs typeface="Arial" charset="0"/>
+              </a:rPr>
+              <a:t>Q</a:t>
+            </a:r>
+            <a:r>
+              <a:rPr lang="en-US">
+                <a:latin typeface="Times New Roman" pitchFamily="18" charset="0"/>
+                <a:cs typeface="Arial" charset="0"/>
+              </a:rPr>
+              <a:t>(</a:t>
+            </a:r>
+            <a:r>
+              <a:rPr lang="en-US" i="1">
+                <a:latin typeface="Times New Roman" pitchFamily="18" charset="0"/>
+                <a:cs typeface="Arial" charset="0"/>
+              </a:rPr>
+              <a:t>n</a:t>
+            </a:r>
+            <a:r>
+              <a:rPr lang="en-US">
+                <a:latin typeface="Times New Roman" pitchFamily="18" charset="0"/>
+                <a:cs typeface="Arial" charset="0"/>
+              </a:rPr>
+              <a:t>)			</a:t>
+            </a:r>
+            <a:r>
+              <a:rPr lang="en-US">
+                <a:latin typeface="Arial" charset="0"/>
+                <a:cs typeface="Arial" charset="0"/>
+              </a:rPr>
+              <a:t>linear</a:t>
+            </a:r>
+          </a:p>
+          <a:p>
+            <a:pPr>
+              <a:buFontTx/>
+              <a:buNone/>
+            </a:pPr>
+            <a:r>
+              <a:rPr lang="en-US">
+                <a:latin typeface="Arial" charset="0"/>
+                <a:cs typeface="Arial" charset="0"/>
+              </a:rPr>
+              <a:t>		 </a:t>
+            </a:r>
+            <a:r>
+              <a:rPr lang="en-US" b="1">
+                <a:latin typeface="Symbol" pitchFamily="18" charset="2"/>
+                <a:cs typeface="Arial" charset="0"/>
+              </a:rPr>
+              <a:t>Q</a:t>
+            </a:r>
+            <a:r>
+              <a:rPr lang="en-US">
+                <a:latin typeface="Times New Roman" pitchFamily="18" charset="0"/>
+                <a:cs typeface="Arial" charset="0"/>
+              </a:rPr>
+              <a:t>(</a:t>
+            </a:r>
+            <a:r>
+              <a:rPr lang="en-US" i="1">
+                <a:latin typeface="Times New Roman" pitchFamily="18" charset="0"/>
+                <a:cs typeface="Arial" charset="0"/>
+              </a:rPr>
+              <a:t>n </a:t>
+            </a:r>
+            <a:r>
+              <a:rPr lang="en-US">
+                <a:latin typeface="Times New Roman" pitchFamily="18" charset="0"/>
+                <a:cs typeface="Arial" charset="0"/>
+              </a:rPr>
+              <a:t>ln(</a:t>
+            </a:r>
+            <a:r>
+              <a:rPr lang="en-US" i="1">
+                <a:latin typeface="Times New Roman" pitchFamily="18" charset="0"/>
+                <a:cs typeface="Arial" charset="0"/>
+              </a:rPr>
+              <a:t>n</a:t>
+            </a:r>
+            <a:r>
+              <a:rPr lang="en-US">
+                <a:latin typeface="Times New Roman" pitchFamily="18" charset="0"/>
+                <a:cs typeface="Arial" charset="0"/>
+              </a:rPr>
+              <a:t>))		</a:t>
+            </a:r>
+            <a:r>
+              <a:rPr lang="en-US">
+                <a:latin typeface="Arial" charset="0"/>
+                <a:cs typeface="Arial" charset="0"/>
+              </a:rPr>
+              <a:t>“</a:t>
+            </a:r>
+            <a:r>
+              <a:rPr lang="en-US" i="1">
+                <a:latin typeface="Times New Roman" pitchFamily="18" charset="0"/>
+                <a:cs typeface="Arial" charset="0"/>
+              </a:rPr>
+              <a:t>n</a:t>
+            </a:r>
+            <a:r>
+              <a:rPr lang="en-US">
+                <a:latin typeface="Arial" charset="0"/>
+                <a:cs typeface="Arial" charset="0"/>
+              </a:rPr>
+              <a:t> log </a:t>
+            </a:r>
+            <a:r>
+              <a:rPr lang="en-US" i="1">
+                <a:latin typeface="Times New Roman" pitchFamily="18" charset="0"/>
+                <a:cs typeface="Arial" charset="0"/>
+              </a:rPr>
+              <a:t>n</a:t>
+            </a:r>
+            <a:r>
+              <a:rPr lang="en-US" i="1">
+                <a:latin typeface="Arial" charset="0"/>
+                <a:cs typeface="Arial" charset="0"/>
+              </a:rPr>
+              <a:t>”</a:t>
+            </a:r>
             <a:endParaRPr lang="en-US">
               <a:latin typeface="Arial" charset="0"/>
               <a:cs typeface="Arial" charset="0"/>
@@ -13760,7 +13872,7 @@
           </a:p>
           <a:p>
             <a:pPr>
-              <a:buFont typeface="Arial" charset="0"/>
+              <a:buFontTx/>
               <a:buNone/>
             </a:pPr>
             <a:r>
@@ -13768,7 +13880,21 @@
                 <a:latin typeface="Arial" charset="0"/>
                 <a:cs typeface="Arial" charset="0"/>
               </a:rPr>
-              <a:t>	Similarly, we will select just one element to represent the entire class of these functions:  </a:t>
+              <a:t>		 </a:t>
+            </a:r>
+            <a:r>
+              <a:rPr lang="en-US" b="1">
+                <a:latin typeface="Symbol" pitchFamily="18" charset="2"/>
+                <a:cs typeface="Arial" charset="0"/>
+              </a:rPr>
+              <a:t>Q</a:t>
+            </a:r>
+            <a:r>
+              <a:rPr lang="en-US">
+                <a:latin typeface="Times New Roman" pitchFamily="18" charset="0"/>
+                <a:cs typeface="Arial" charset="0"/>
+              </a:rPr>
+              <a:t>(</a:t>
             </a:r>
             <a:r>
               <a:rPr lang="en-US" i="1">
@@ -13784,18 +13910,160 @@
               </a:rPr>
               <a:t>2</a:t>
             </a:r>
-          </a:p>
-          <a:p>
-            <a:pPr lvl="1"/>
             <a:r>
               <a:rPr lang="en-US">
-                <a:latin typeface="Arial" charset="0"/>
-                <a:cs typeface="Arial" charset="0"/>
-              </a:rPr>
-              <a:t>We could chose any function, but this is the simplest</a:t>
-            </a:r>
-            <a:endParaRPr lang="en-US">
-              <a:latin typeface="Times New Roman" pitchFamily="18" charset="0"/>
+                <a:latin typeface="Times New Roman" pitchFamily="18" charset="0"/>
+                <a:cs typeface="Arial" charset="0"/>
+              </a:rPr>
+              <a:t>)			</a:t>
+            </a:r>
+            <a:r>
+              <a:rPr lang="en-US">
+                <a:latin typeface="Arial" charset="0"/>
+                <a:cs typeface="Arial" charset="0"/>
+              </a:rPr>
+              <a:t>quadratic</a:t>
+            </a:r>
+          </a:p>
+          <a:p>
+            <a:pPr>
+              <a:buFontTx/>
+              <a:buNone/>
+            </a:pPr>
+            <a:r>
+              <a:rPr lang="en-US">
+                <a:latin typeface="Arial" charset="0"/>
+                <a:cs typeface="Arial" charset="0"/>
+              </a:rPr>
+              <a:t>		 </a:t>
+            </a:r>
+            <a:r>
+              <a:rPr lang="en-US" b="1">
+                <a:latin typeface="Symbol" pitchFamily="18" charset="2"/>
+                <a:cs typeface="Arial" charset="0"/>
+              </a:rPr>
+              <a:t>Q</a:t>
+            </a:r>
+            <a:r>
+              <a:rPr lang="en-US">
+                <a:latin typeface="Times New Roman" pitchFamily="18" charset="0"/>
+                <a:cs typeface="Arial" charset="0"/>
+              </a:rPr>
+              <a:t>(</a:t>
+            </a:r>
+            <a:r>
+              <a:rPr lang="en-US" i="1">
+                <a:latin typeface="Times New Roman" pitchFamily="18" charset="0"/>
+                <a:cs typeface="Arial" charset="0"/>
+              </a:rPr>
+              <a:t>n</a:t>
+            </a:r>
+            <a:r>
+              <a:rPr lang="en-US" baseline="30000">
+                <a:latin typeface="Times New Roman" pitchFamily="18" charset="0"/>
+                <a:cs typeface="Arial" charset="0"/>
+              </a:rPr>
+              <a:t>3</a:t>
+            </a:r>
+            <a:r>
+              <a:rPr lang="en-US">
+                <a:latin typeface="Times New Roman" pitchFamily="18" charset="0"/>
+                <a:cs typeface="Arial" charset="0"/>
+              </a:rPr>
+              <a:t>)			</a:t>
+            </a:r>
+            <a:r>
+              <a:rPr lang="en-US">
+                <a:latin typeface="Arial" charset="0"/>
+                <a:cs typeface="Arial" charset="0"/>
+              </a:rPr>
+              <a:t>cubic</a:t>
+            </a:r>
+          </a:p>
+          <a:p>
+            <a:pPr>
+              <a:buFontTx/>
+              <a:buNone/>
+            </a:pPr>
+            <a:r>
+              <a:rPr lang="en-US">
+                <a:latin typeface="Arial" charset="0"/>
+                <a:cs typeface="Arial" charset="0"/>
+              </a:rPr>
+              <a:t>		 </a:t>
+            </a:r>
+            <a:r>
+              <a:rPr lang="en-US">
+                <a:latin typeface="Times New Roman" pitchFamily="18" charset="0"/>
+                <a:cs typeface="Arial" charset="0"/>
+              </a:rPr>
+              <a:t>2</a:t>
+            </a:r>
+            <a:r>
+              <a:rPr lang="en-US" i="1" baseline="30000">
+                <a:latin typeface="Times New Roman" pitchFamily="18" charset="0"/>
+                <a:cs typeface="Arial" charset="0"/>
+              </a:rPr>
+              <a:t>n</a:t>
+            </a:r>
+            <a:r>
+              <a:rPr lang="en-US" i="1">
+                <a:latin typeface="Times New Roman" pitchFamily="18" charset="0"/>
+                <a:cs typeface="Arial" charset="0"/>
+              </a:rPr>
+              <a:t>, e</a:t>
+            </a:r>
+            <a:r>
+              <a:rPr lang="en-US" i="1" baseline="30000">
+                <a:latin typeface="Times New Roman" pitchFamily="18" charset="0"/>
+                <a:cs typeface="Arial" charset="0"/>
+              </a:rPr>
+              <a:t>n</a:t>
+            </a:r>
+            <a:r>
+              <a:rPr lang="en-US" i="1">
+                <a:latin typeface="Times New Roman" pitchFamily="18" charset="0"/>
+                <a:cs typeface="Arial" charset="0"/>
+              </a:rPr>
+              <a:t>, </a:t>
+            </a:r>
+            <a:r>
+              <a:rPr lang="en-US">
+                <a:latin typeface="Times New Roman" pitchFamily="18" charset="0"/>
+                <a:cs typeface="Arial" charset="0"/>
+              </a:rPr>
+              <a:t>4</a:t>
+            </a:r>
+            <a:r>
+              <a:rPr lang="en-US" i="1" baseline="30000">
+                <a:latin typeface="Times New Roman" pitchFamily="18" charset="0"/>
+                <a:cs typeface="Arial" charset="0"/>
+              </a:rPr>
+              <a:t>n</a:t>
+            </a:r>
+            <a:r>
+              <a:rPr lang="en-US" i="1">
+                <a:latin typeface="Times New Roman" pitchFamily="18" charset="0"/>
+                <a:cs typeface="Arial" charset="0"/>
+              </a:rPr>
+              <a:t>, ...</a:t>
+            </a:r>
+            <a:r>
+              <a:rPr lang="en-US">
+                <a:latin typeface="Times New Roman" pitchFamily="18" charset="0"/>
+                <a:cs typeface="Arial" charset="0"/>
+              </a:rPr>
+              <a:t>		</a:t>
+            </a:r>
+            <a:r>
+              <a:rPr lang="en-US">
+                <a:latin typeface="Arial" charset="0"/>
+                <a:cs typeface="Arial" charset="0"/>
+              </a:rPr>
+              <a:t>exponential</a:t>
+            </a:r>
+            <a:endParaRPr lang="en-US" baseline="30000">
+              <a:latin typeface="Arial" charset="0"/>
               <a:cs typeface="Arial" charset="0"/>
             </a:endParaRPr>
           </a:p>
@@ -13828,520 +14096,6 @@
       </p:grpSpPr>
       <p:sp>
         <p:nvSpPr>
-          <p:cNvPr id="55298" name="Rectangle 2"/>
-          <p:cNvSpPr>
-            <a:spLocks noGrp="1" noChangeArrowheads="1"/>
-          </p:cNvSpPr>
-          <p:nvPr>
-            <p:ph type="title"/>
-          </p:nvPr>
-        </p:nvSpPr>
-        <p:spPr/>
-        <p:txBody>
-          <a:bodyPr/>
-          <a:lstStyle/>
-          <a:p>
-            <a:r>
-              <a:rPr lang="en-US">
-                <a:latin typeface="Arial" charset="0"/>
-                <a:cs typeface="Arial" charset="0"/>
-              </a:rPr>
-              <a:t>Big-</a:t>
-            </a:r>
-            <a:r>
-              <a:rPr lang="en-US" b="1">
-                <a:latin typeface="Symbol" pitchFamily="18" charset="2"/>
-                <a:cs typeface="Arial" charset="0"/>
-              </a:rPr>
-              <a:t>Q</a:t>
-            </a:r>
-            <a:r>
-              <a:rPr lang="en-US">
-                <a:latin typeface="Arial" charset="0"/>
-                <a:cs typeface="Arial" charset="0"/>
-              </a:rPr>
-              <a:t> as an Equivalence Relation</a:t>
-            </a:r>
-          </a:p>
-        </p:txBody>
-      </p:sp>
-      <p:sp>
-        <p:nvSpPr>
-          <p:cNvPr id="55299" name="Rectangle 3"/>
-          <p:cNvSpPr>
-            <a:spLocks noGrp="1" noChangeArrowheads="1"/>
-          </p:cNvSpPr>
-          <p:nvPr>
-            <p:ph type="body" idx="1"/>
-          </p:nvPr>
-        </p:nvSpPr>
-        <p:spPr/>
-        <p:txBody>
-          <a:bodyPr/>
-          <a:lstStyle/>
-          <a:p>
-            <a:pPr>
-              <a:buFont typeface="Arial" charset="0"/>
-              <a:buNone/>
-            </a:pPr>
-            <a:r>
-              <a:rPr lang="en-US">
-                <a:latin typeface="Arial" charset="0"/>
-                <a:cs typeface="Arial" charset="0"/>
-              </a:rPr>
-              <a:t>	The most common classes are given names:</a:t>
-            </a:r>
-          </a:p>
-          <a:p>
-            <a:pPr>
-              <a:buFontTx/>
-              <a:buNone/>
-            </a:pPr>
-            <a:r>
-              <a:rPr lang="en-US">
-                <a:latin typeface="Arial" charset="0"/>
-                <a:cs typeface="Arial" charset="0"/>
-              </a:rPr>
-              <a:t>		 </a:t>
-            </a:r>
-            <a:r>
-              <a:rPr lang="en-US" b="1">
-                <a:latin typeface="Symbol" pitchFamily="18" charset="2"/>
-                <a:cs typeface="Arial" charset="0"/>
-              </a:rPr>
-              <a:t>Q</a:t>
-            </a:r>
-            <a:r>
-              <a:rPr lang="en-US">
-                <a:latin typeface="Times New Roman" pitchFamily="18" charset="0"/>
-                <a:cs typeface="Arial" charset="0"/>
-              </a:rPr>
-              <a:t>(1)			</a:t>
-            </a:r>
-            <a:r>
-              <a:rPr lang="en-US">
-                <a:latin typeface="Arial" charset="0"/>
-                <a:cs typeface="Arial" charset="0"/>
-              </a:rPr>
-              <a:t>constant</a:t>
-            </a:r>
-          </a:p>
-          <a:p>
-            <a:pPr>
-              <a:buFontTx/>
-              <a:buNone/>
-            </a:pPr>
-            <a:r>
-              <a:rPr lang="en-US">
-                <a:latin typeface="Arial" charset="0"/>
-                <a:cs typeface="Arial" charset="0"/>
-              </a:rPr>
-              <a:t>		 </a:t>
-            </a:r>
-            <a:r>
-              <a:rPr lang="en-US" b="1">
-                <a:latin typeface="Symbol" pitchFamily="18" charset="2"/>
-                <a:cs typeface="Arial" charset="0"/>
-              </a:rPr>
-              <a:t>Q</a:t>
-            </a:r>
-            <a:r>
-              <a:rPr lang="en-US">
-                <a:latin typeface="Times New Roman" pitchFamily="18" charset="0"/>
-                <a:cs typeface="Arial" charset="0"/>
-              </a:rPr>
-              <a:t>(ln(</a:t>
-            </a:r>
-            <a:r>
-              <a:rPr lang="en-US" i="1">
-                <a:latin typeface="Times New Roman" pitchFamily="18" charset="0"/>
-                <a:cs typeface="Arial" charset="0"/>
-              </a:rPr>
-              <a:t>n</a:t>
-            </a:r>
-            <a:r>
-              <a:rPr lang="en-US">
-                <a:latin typeface="Times New Roman" pitchFamily="18" charset="0"/>
-                <a:cs typeface="Arial" charset="0"/>
-              </a:rPr>
-              <a:t>))		</a:t>
-            </a:r>
-            <a:r>
-              <a:rPr lang="en-US">
-                <a:latin typeface="Arial" charset="0"/>
-                <a:cs typeface="Arial" charset="0"/>
-              </a:rPr>
-              <a:t>logarithmic</a:t>
-            </a:r>
-          </a:p>
-          <a:p>
-            <a:pPr>
-              <a:buFontTx/>
-              <a:buNone/>
-            </a:pPr>
-            <a:r>
-              <a:rPr lang="en-US">
-                <a:latin typeface="Arial" charset="0"/>
-                <a:cs typeface="Arial" charset="0"/>
-              </a:rPr>
-              <a:t>		 </a:t>
-            </a:r>
-            <a:r>
-              <a:rPr lang="en-US" b="1">
-                <a:latin typeface="Symbol" pitchFamily="18" charset="2"/>
-                <a:cs typeface="Arial" charset="0"/>
-              </a:rPr>
-              <a:t>Q</a:t>
-            </a:r>
-            <a:r>
-              <a:rPr lang="en-US">
-                <a:latin typeface="Times New Roman" pitchFamily="18" charset="0"/>
-                <a:cs typeface="Arial" charset="0"/>
-              </a:rPr>
-              <a:t>(</a:t>
-            </a:r>
-            <a:r>
-              <a:rPr lang="en-US" i="1">
-                <a:latin typeface="Times New Roman" pitchFamily="18" charset="0"/>
-                <a:cs typeface="Arial" charset="0"/>
-              </a:rPr>
-              <a:t>n</a:t>
-            </a:r>
-            <a:r>
-              <a:rPr lang="en-US">
-                <a:latin typeface="Times New Roman" pitchFamily="18" charset="0"/>
-                <a:cs typeface="Arial" charset="0"/>
-              </a:rPr>
-              <a:t>)			</a:t>
-            </a:r>
-            <a:r>
-              <a:rPr lang="en-US">
-                <a:latin typeface="Arial" charset="0"/>
-                <a:cs typeface="Arial" charset="0"/>
-              </a:rPr>
-              <a:t>linear</a:t>
-            </a:r>
-          </a:p>
-          <a:p>
-            <a:pPr>
-              <a:buFontTx/>
-              <a:buNone/>
-            </a:pPr>
-            <a:r>
-              <a:rPr lang="en-US">
-                <a:latin typeface="Arial" charset="0"/>
-                <a:cs typeface="Arial" charset="0"/>
-              </a:rPr>
-              <a:t>		 </a:t>
-            </a:r>
-            <a:r>
-              <a:rPr lang="en-US" b="1">
-                <a:latin typeface="Symbol" pitchFamily="18" charset="2"/>
-                <a:cs typeface="Arial" charset="0"/>
-              </a:rPr>
-              <a:t>Q</a:t>
-            </a:r>
-            <a:r>
-              <a:rPr lang="en-US">
-                <a:latin typeface="Times New Roman" pitchFamily="18" charset="0"/>
-                <a:cs typeface="Arial" charset="0"/>
-              </a:rPr>
-              <a:t>(</a:t>
-            </a:r>
-            <a:r>
-              <a:rPr lang="en-US" i="1">
-                <a:latin typeface="Times New Roman" pitchFamily="18" charset="0"/>
-                <a:cs typeface="Arial" charset="0"/>
-              </a:rPr>
-              <a:t>n </a:t>
-            </a:r>
-            <a:r>
-              <a:rPr lang="en-US">
-                <a:latin typeface="Times New Roman" pitchFamily="18" charset="0"/>
-                <a:cs typeface="Arial" charset="0"/>
-              </a:rPr>
-              <a:t>ln(</a:t>
-            </a:r>
-            <a:r>
-              <a:rPr lang="en-US" i="1">
-                <a:latin typeface="Times New Roman" pitchFamily="18" charset="0"/>
-                <a:cs typeface="Arial" charset="0"/>
-              </a:rPr>
-              <a:t>n</a:t>
-            </a:r>
-            <a:r>
-              <a:rPr lang="en-US">
-                <a:latin typeface="Times New Roman" pitchFamily="18" charset="0"/>
-                <a:cs typeface="Arial" charset="0"/>
-              </a:rPr>
-              <a:t>))		</a:t>
-            </a:r>
-            <a:r>
-              <a:rPr lang="en-US">
-                <a:latin typeface="Arial" charset="0"/>
-                <a:cs typeface="Arial" charset="0"/>
-              </a:rPr>
-              <a:t>“</a:t>
-            </a:r>
-            <a:r>
-              <a:rPr lang="en-US" i="1">
-                <a:latin typeface="Times New Roman" pitchFamily="18" charset="0"/>
-                <a:cs typeface="Arial" charset="0"/>
-              </a:rPr>
-              <a:t>n</a:t>
-            </a:r>
-            <a:r>
-              <a:rPr lang="en-US">
-                <a:latin typeface="Arial" charset="0"/>
-                <a:cs typeface="Arial" charset="0"/>
-              </a:rPr>
-              <a:t> log </a:t>
-            </a:r>
-            <a:r>
-              <a:rPr lang="en-US" i="1">
-                <a:latin typeface="Times New Roman" pitchFamily="18" charset="0"/>
-                <a:cs typeface="Arial" charset="0"/>
-              </a:rPr>
-              <a:t>n</a:t>
-            </a:r>
-            <a:r>
-              <a:rPr lang="en-US" i="1">
-                <a:latin typeface="Arial" charset="0"/>
-                <a:cs typeface="Arial" charset="0"/>
-              </a:rPr>
-              <a:t>”</a:t>
-            </a:r>
-            <a:endParaRPr lang="en-US">
-              <a:latin typeface="Arial" charset="0"/>
-              <a:cs typeface="Arial" charset="0"/>
-            </a:endParaRPr>
-          </a:p>
-          <a:p>
-            <a:pPr>
-              <a:buFontTx/>
-              <a:buNone/>
-            </a:pPr>
-            <a:r>
-              <a:rPr lang="en-US">
-                <a:latin typeface="Arial" charset="0"/>
-                <a:cs typeface="Arial" charset="0"/>
-              </a:rPr>
-              <a:t>		 </a:t>
-            </a:r>
-            <a:r>
-              <a:rPr lang="en-US" b="1">
-                <a:latin typeface="Symbol" pitchFamily="18" charset="2"/>
-                <a:cs typeface="Arial" charset="0"/>
-              </a:rPr>
-              <a:t>Q</a:t>
-            </a:r>
-            <a:r>
-              <a:rPr lang="en-US">
-                <a:latin typeface="Times New Roman" pitchFamily="18" charset="0"/>
-                <a:cs typeface="Arial" charset="0"/>
-              </a:rPr>
-              <a:t>(</a:t>
-            </a:r>
-            <a:r>
-              <a:rPr lang="en-US" i="1">
-                <a:latin typeface="Times New Roman" pitchFamily="18" charset="0"/>
-                <a:cs typeface="Arial" charset="0"/>
-              </a:rPr>
-              <a:t>n</a:t>
-            </a:r>
-            <a:r>
-              <a:rPr lang="en-US" baseline="30000">
-                <a:latin typeface="Times New Roman" pitchFamily="18" charset="0"/>
-                <a:cs typeface="Arial" charset="0"/>
-              </a:rPr>
-              <a:t>2</a:t>
-            </a:r>
-            <a:r>
-              <a:rPr lang="en-US">
-                <a:latin typeface="Times New Roman" pitchFamily="18" charset="0"/>
-                <a:cs typeface="Arial" charset="0"/>
-              </a:rPr>
-              <a:t>)			</a:t>
-            </a:r>
-            <a:r>
-              <a:rPr lang="en-US">
-                <a:latin typeface="Arial" charset="0"/>
-                <a:cs typeface="Arial" charset="0"/>
-              </a:rPr>
-              <a:t>quadratic</a:t>
-            </a:r>
-          </a:p>
-          <a:p>
-            <a:pPr>
-              <a:buFontTx/>
-              <a:buNone/>
-            </a:pPr>
-            <a:r>
-              <a:rPr lang="en-US">
-                <a:latin typeface="Arial" charset="0"/>
-                <a:cs typeface="Arial" charset="0"/>
-              </a:rPr>
-              <a:t>		 </a:t>
-            </a:r>
-            <a:r>
-              <a:rPr lang="en-US" b="1">
-                <a:latin typeface="Symbol" pitchFamily="18" charset="2"/>
-                <a:cs typeface="Arial" charset="0"/>
-              </a:rPr>
-              <a:t>Q</a:t>
-            </a:r>
-            <a:r>
-              <a:rPr lang="en-US">
-                <a:latin typeface="Times New Roman" pitchFamily="18" charset="0"/>
-                <a:cs typeface="Arial" charset="0"/>
-              </a:rPr>
-              <a:t>(</a:t>
-            </a:r>
-            <a:r>
-              <a:rPr lang="en-US" i="1">
-                <a:latin typeface="Times New Roman" pitchFamily="18" charset="0"/>
-                <a:cs typeface="Arial" charset="0"/>
-              </a:rPr>
-              <a:t>n</a:t>
-            </a:r>
-            <a:r>
-              <a:rPr lang="en-US" baseline="30000">
-                <a:latin typeface="Times New Roman" pitchFamily="18" charset="0"/>
-                <a:cs typeface="Arial" charset="0"/>
-              </a:rPr>
-              <a:t>3</a:t>
-            </a:r>
-            <a:r>
-              <a:rPr lang="en-US">
-                <a:latin typeface="Times New Roman" pitchFamily="18" charset="0"/>
-                <a:cs typeface="Arial" charset="0"/>
-              </a:rPr>
-              <a:t>)			</a:t>
-            </a:r>
-            <a:r>
-              <a:rPr lang="en-US">
-                <a:latin typeface="Arial" charset="0"/>
-                <a:cs typeface="Arial" charset="0"/>
-              </a:rPr>
-              <a:t>cubic</a:t>
-            </a:r>
-          </a:p>
-          <a:p>
-            <a:pPr>
-              <a:buFontTx/>
-              <a:buNone/>
-            </a:pPr>
-            <a:r>
-              <a:rPr lang="en-US">
-                <a:latin typeface="Arial" charset="0"/>
-                <a:cs typeface="Arial" charset="0"/>
-              </a:rPr>
-              <a:t>		 </a:t>
-            </a:r>
-            <a:r>
-              <a:rPr lang="en-US">
-                <a:latin typeface="Times New Roman" pitchFamily="18" charset="0"/>
-                <a:cs typeface="Arial" charset="0"/>
-              </a:rPr>
-              <a:t>2</a:t>
-            </a:r>
-            <a:r>
-              <a:rPr lang="en-US" i="1" baseline="30000">
-                <a:latin typeface="Times New Roman" pitchFamily="18" charset="0"/>
-                <a:cs typeface="Arial" charset="0"/>
-              </a:rPr>
-              <a:t>n</a:t>
-            </a:r>
-            <a:r>
-              <a:rPr lang="en-US" i="1">
-                <a:latin typeface="Times New Roman" pitchFamily="18" charset="0"/>
-                <a:cs typeface="Arial" charset="0"/>
-              </a:rPr>
-              <a:t>, e</a:t>
-            </a:r>
-            <a:r>
-              <a:rPr lang="en-US" i="1" baseline="30000">
-                <a:latin typeface="Times New Roman" pitchFamily="18" charset="0"/>
-                <a:cs typeface="Arial" charset="0"/>
-              </a:rPr>
-              <a:t>n</a:t>
-            </a:r>
-            <a:r>
-              <a:rPr lang="en-US" i="1">
-                <a:latin typeface="Times New Roman" pitchFamily="18" charset="0"/>
-                <a:cs typeface="Arial" charset="0"/>
-              </a:rPr>
-              <a:t>, </a:t>
-            </a:r>
-            <a:r>
-              <a:rPr lang="en-US">
-                <a:latin typeface="Times New Roman" pitchFamily="18" charset="0"/>
-                <a:cs typeface="Arial" charset="0"/>
-              </a:rPr>
-              <a:t>4</a:t>
-            </a:r>
-            <a:r>
-              <a:rPr lang="en-US" i="1" baseline="30000">
-                <a:latin typeface="Times New Roman" pitchFamily="18" charset="0"/>
-                <a:cs typeface="Arial" charset="0"/>
-              </a:rPr>
-              <a:t>n</a:t>
-            </a:r>
-            <a:r>
-              <a:rPr lang="en-US" i="1">
-                <a:latin typeface="Times New Roman" pitchFamily="18" charset="0"/>
-                <a:cs typeface="Arial" charset="0"/>
-              </a:rPr>
-              <a:t>, ...</a:t>
-            </a:r>
-            <a:r>
-              <a:rPr lang="en-US">
-                <a:latin typeface="Times New Roman" pitchFamily="18" charset="0"/>
-                <a:cs typeface="Arial" charset="0"/>
-              </a:rPr>
-              <a:t>		</a:t>
-            </a:r>
-            <a:r>
-              <a:rPr lang="en-US">
-                <a:latin typeface="Arial" charset="0"/>
-                <a:cs typeface="Arial" charset="0"/>
-              </a:rPr>
-              <a:t>exponential</a:t>
-            </a:r>
-            <a:endParaRPr lang="en-US" baseline="30000">
-              <a:latin typeface="Arial" charset="0"/>
-              <a:cs typeface="Arial" charset="0"/>
-            </a:endParaRPr>
-          </a:p>
-        </p:txBody>
-      </p:sp>
-    </p:spTree>
-  </p:cSld>
-  <p:clrMapOvr>
-    <a:masterClrMapping/>
-  </p:clrMapOvr>
-</p:sld>
-</file>
-
-<file path=ppt/slides/slide34.xml><?xml version="1.0" encoding="utf-8"?>
-<p:sld xmlns:a="http://schemas.openxmlformats.org/drawingml/2006/main" xmlns:r="http://schemas.openxmlformats.org/officeDocument/2006/relationships" xmlns:p="http://schemas.openxmlformats.org/presentationml/2006/main">
-  <p:cSld>
-    <p:spTree>
-      <p:nvGrpSpPr>
-        <p:cNvPr id="1" name=""/>
-        <p:cNvGrpSpPr/>
-        <p:nvPr/>
-      </p:nvGrpSpPr>
-      <p:grpSpPr>
-        <a:xfrm>
-          <a:off x="0" y="0"/>
-          <a:ext cx="0" cy="0"/>
-          <a:chOff x="0" y="0"/>
-          <a:chExt cx="0" cy="0"/>
-        </a:xfrm>
-      </p:grpSpPr>
-      <p:sp>
-        <p:nvSpPr>
           <p:cNvPr id="7171" name="Rectangle 2"/>
           <p:cNvSpPr>
             <a:spLocks noGrp="1" noChangeArrowheads="1"/>
@@ -14599,10 +14353,10 @@
             </a:r>
             <a:r>
               <a:rPr lang="en-US" b="1" dirty="0">
-                <a:latin typeface="Times New Roman" pitchFamily="18" charset="0"/>
-                <a:cs typeface="Arial" charset="0"/>
-              </a:rPr>
-              <a:t>o</a:t>
+                <a:latin typeface="Symbol" pitchFamily="18" charset="2"/>
+                <a:cs typeface="Arial" charset="0"/>
+              </a:rPr>
+              <a:t>Q</a:t>
             </a:r>
             <a:r>
               <a:rPr lang="en-US" dirty="0">
@@ -14687,7 +14441,7 @@
           <a:graphicData uri="http://schemas.openxmlformats.org/presentationml/2006/ole">
             <mc:AlternateContent xmlns:mc="http://schemas.openxmlformats.org/markup-compatibility/2006">
               <mc:Choice xmlns:v="urn:schemas-microsoft-com:vml" Requires="v">
-                <p:oleObj spid="_x0000_s3103" name="Equation" r:id="rId4" imgW="1447560" imgH="469800" progId="Equation.3">
+                <p:oleObj spid="_x0000_s3107" name="Equation" r:id="rId4" imgW="1447560" imgH="469800" progId="Equation.3">
                   <p:embed/>
                 </p:oleObj>
               </mc:Choice>
@@ -14749,7 +14503,7 @@
 </p:sld>
 </file>
 
-<file path=ppt/slides/slide35.xml><?xml version="1.0" encoding="utf-8"?>
+<file path=ppt/slides/slide34.xml><?xml version="1.0" encoding="utf-8"?>
 <p:sld xmlns:a="http://schemas.openxmlformats.org/drawingml/2006/main" xmlns:r="http://schemas.openxmlformats.org/officeDocument/2006/relationships" xmlns:p="http://schemas.openxmlformats.org/presentationml/2006/main">
   <p:cSld>
     <p:spTree>
@@ -15063,7 +14817,7 @@
 </p:sld>
 </file>
 
-<file path=ppt/slides/slide36.xml><?xml version="1.0" encoding="utf-8"?>
+<file path=ppt/slides/slide35.xml><?xml version="1.0" encoding="utf-8"?>
 <p:sld xmlns:a="http://schemas.openxmlformats.org/drawingml/2006/main" xmlns:r="http://schemas.openxmlformats.org/officeDocument/2006/relationships" xmlns:p="http://schemas.openxmlformats.org/presentationml/2006/main">
   <p:cSld>
     <p:spTree>
@@ -15188,7 +14942,7 @@
 </p:sld>
 </file>
 
-<file path=ppt/slides/slide37.xml><?xml version="1.0" encoding="utf-8"?>
+<file path=ppt/slides/slide36.xml><?xml version="1.0" encoding="utf-8"?>
 <p:sld xmlns:a="http://schemas.openxmlformats.org/drawingml/2006/main" xmlns:r="http://schemas.openxmlformats.org/officeDocument/2006/relationships" xmlns:p="http://schemas.openxmlformats.org/presentationml/2006/main">
   <p:cSld>
     <p:spTree>
@@ -15243,7 +14997,7 @@
         <p:spPr/>
         <p:txBody>
           <a:bodyPr>
-            <a:normAutofit lnSpcReduction="10000"/>
+            <a:normAutofit/>
           </a:bodyPr>
           <a:lstStyle/>
           <a:p>
@@ -15256,7 +15010,21 @@
                 <a:latin typeface="Arial" charset="0"/>
                 <a:cs typeface="Arial" charset="0"/>
               </a:rPr>
-              <a:t>	We will use Landau symbols to describe the complexity of algorithms</a:t>
+              <a:t>	We will use </a:t>
+            </a:r>
+            <a:r>
+              <a:rPr lang="en-US" b="1" dirty="0">
+                <a:latin typeface="Symbol" pitchFamily="18" charset="2"/>
+                <a:cs typeface="Arial" charset="0"/>
+              </a:rPr>
+              <a:t>Q</a:t>
+            </a:r>
+            <a:r>
+              <a:rPr lang="en-CA" dirty="0">
+                <a:latin typeface="Arial" charset="0"/>
+                <a:cs typeface="Arial" charset="0"/>
+              </a:rPr>
+              <a:t> symbols to describe the complexity of algorithms</a:t>
             </a:r>
           </a:p>
           <a:p>
@@ -15352,11 +15120,18 @@
               <a:t> if its run-time may be described by </a:t>
             </a:r>
             <a:r>
+              <a:rPr lang="en-US" b="1" dirty="0">
+                <a:latin typeface="Symbol" pitchFamily="18" charset="2"/>
+                <a:cs typeface="Arial" charset="0"/>
+              </a:rPr>
+              <a:t>Q</a:t>
+            </a:r>
+            <a:r>
               <a:rPr lang="en-CA" dirty="0">
                 <a:latin typeface="Times New Roman" pitchFamily="18" charset="0"/>
                 <a:cs typeface="Times New Roman" pitchFamily="18" charset="0"/>
               </a:rPr>
-              <a:t>O(</a:t>
+              <a:t>(</a:t>
             </a:r>
             <a:r>
               <a:rPr lang="en-CA" i="1" dirty="0" err="1">
@@ -15553,7 +15328,7 @@
 </p:sld>
 </file>
 
-<file path=ppt/slides/slide38.xml><?xml version="1.0" encoding="utf-8"?>
+<file path=ppt/slides/slide37.xml><?xml version="1.0" encoding="utf-8"?>
 <p:sld xmlns:a="http://schemas.openxmlformats.org/drawingml/2006/main" xmlns:r="http://schemas.openxmlformats.org/officeDocument/2006/relationships" xmlns:p="http://schemas.openxmlformats.org/presentationml/2006/main">
   <p:cSld>
     <p:spTree>
@@ -15714,6 +15489,122 @@
 </p:sld>
 </file>
 
+<file path=ppt/slides/slide38.xml><?xml version="1.0" encoding="utf-8"?>
+<p:sld xmlns:a="http://schemas.openxmlformats.org/drawingml/2006/main" xmlns:r="http://schemas.openxmlformats.org/officeDocument/2006/relationships" xmlns:p="http://schemas.openxmlformats.org/presentationml/2006/main">
+  <p:cSld>
+    <p:spTree>
+      <p:nvGrpSpPr>
+        <p:cNvPr id="1" name=""/>
+        <p:cNvGrpSpPr/>
+        <p:nvPr/>
+      </p:nvGrpSpPr>
+      <p:grpSpPr>
+        <a:xfrm>
+          <a:off x="0" y="0"/>
+          <a:ext cx="0" cy="0"/>
+          <a:chOff x="0" y="0"/>
+          <a:chExt cx="0" cy="0"/>
+        </a:xfrm>
+      </p:grpSpPr>
+      <p:sp>
+        <p:nvSpPr>
+          <p:cNvPr id="62466" name="Rectangle 2"/>
+          <p:cNvSpPr>
+            <a:spLocks noGrp="1" noChangeArrowheads="1"/>
+          </p:cNvSpPr>
+          <p:nvPr>
+            <p:ph type="title"/>
+          </p:nvPr>
+        </p:nvSpPr>
+        <p:spPr/>
+        <p:txBody>
+          <a:bodyPr/>
+          <a:lstStyle/>
+          <a:p>
+            <a:r>
+              <a:rPr lang="en-US">
+                <a:latin typeface="Arial" charset="0"/>
+                <a:cs typeface="Arial" charset="0"/>
+              </a:rPr>
+              <a:t>Summary</a:t>
+            </a:r>
+          </a:p>
+        </p:txBody>
+      </p:sp>
+      <p:sp>
+        <p:nvSpPr>
+          <p:cNvPr id="62467" name="Rectangle 3"/>
+          <p:cNvSpPr>
+            <a:spLocks noGrp="1" noChangeArrowheads="1"/>
+          </p:cNvSpPr>
+          <p:nvPr>
+            <p:ph type="body" idx="1"/>
+          </p:nvPr>
+        </p:nvSpPr>
+        <p:spPr/>
+        <p:txBody>
+          <a:bodyPr/>
+          <a:lstStyle/>
+          <a:p>
+            <a:pPr>
+              <a:buFont typeface="Arial" charset="0"/>
+              <a:buNone/>
+            </a:pPr>
+            <a:r>
+              <a:rPr lang="en-US" dirty="0">
+                <a:latin typeface="Arial" charset="0"/>
+                <a:cs typeface="Arial" charset="0"/>
+              </a:rPr>
+              <a:t>	In this class, we have:</a:t>
+            </a:r>
+          </a:p>
+          <a:p>
+            <a:pPr lvl="1"/>
+            <a:r>
+              <a:rPr lang="en-US" dirty="0">
+                <a:latin typeface="Arial" charset="0"/>
+                <a:cs typeface="Arial" charset="0"/>
+              </a:rPr>
+              <a:t>Introducing the new notation: </a:t>
+            </a:r>
+            <a:r>
+              <a:rPr lang="en-US" b="1" dirty="0">
+                <a:latin typeface="Symbol" pitchFamily="18" charset="2"/>
+                <a:cs typeface="Arial" charset="0"/>
+              </a:rPr>
+              <a:t>Q </a:t>
+            </a:r>
+          </a:p>
+          <a:p>
+            <a:pPr lvl="1"/>
+            <a:r>
+              <a:rPr lang="en-US" dirty="0">
+                <a:latin typeface="Arial" charset="0"/>
+                <a:cs typeface="Arial" charset="0"/>
+              </a:rPr>
+              <a:t>Discussed how to use these</a:t>
+            </a:r>
+          </a:p>
+          <a:p>
+            <a:pPr lvl="1"/>
+            <a:r>
+              <a:rPr lang="en-US" dirty="0">
+                <a:latin typeface="Arial" charset="0"/>
+                <a:cs typeface="Arial" charset="0"/>
+              </a:rPr>
+              <a:t>Looked at the equivalence relations</a:t>
+            </a:r>
+          </a:p>
+        </p:txBody>
+      </p:sp>
+    </p:spTree>
+  </p:cSld>
+  <p:clrMapOvr>
+    <a:masterClrMapping/>
+  </p:clrMapOvr>
+</p:sld>
+</file>
+
 <file path=ppt/slides/slide39.xml><?xml version="1.0" encoding="utf-8"?>
 <p:sld xmlns:a="http://schemas.openxmlformats.org/drawingml/2006/main" xmlns:r="http://schemas.openxmlformats.org/officeDocument/2006/relationships" xmlns:p="http://schemas.openxmlformats.org/presentationml/2006/main">
   <p:cSld>
@@ -15733,9 +15624,15 @@
       </p:grpSpPr>
       <p:sp>
         <p:nvSpPr>
-          <p:cNvPr id="62466" name="Rectangle 2"/>
-          <p:cNvSpPr>
-            <a:spLocks noGrp="1" noChangeArrowheads="1"/>
+          <p:cNvPr id="2" name="Title 1">
+            <a:extLst>
+              <a:ext uri="{FF2B5EF4-FFF2-40B4-BE49-F238E27FC236}">
+                <a16:creationId xmlns:a16="http://schemas.microsoft.com/office/drawing/2014/main" id="{ABD76339-190F-BE4C-A3F1-8DA98773FC23}"/>
+              </a:ext>
+            </a:extLst>
+          </p:cNvPr>
+          <p:cNvSpPr>
+            <a:spLocks noGrp="1"/>
           </p:cNvSpPr>
           <p:nvPr>
             <p:ph type="title"/>
@@ -15747,100 +15644,214 @@
           <a:lstStyle/>
           <a:p>
             <a:r>
-              <a:rPr lang="en-US">
-                <a:latin typeface="Arial" charset="0"/>
-                <a:cs typeface="Arial" charset="0"/>
-              </a:rPr>
-              <a:t>Summary</a:t>
-            </a:r>
-          </a:p>
-        </p:txBody>
-      </p:sp>
-      <p:sp>
-        <p:nvSpPr>
-          <p:cNvPr id="62467" name="Rectangle 3"/>
-          <p:cNvSpPr>
-            <a:spLocks noGrp="1" noChangeArrowheads="1"/>
-          </p:cNvSpPr>
-          <p:nvPr>
-            <p:ph type="body" idx="1"/>
+              <a:rPr lang="en-US" dirty="0"/>
+              <a:t>LAB 1</a:t>
+            </a:r>
+          </a:p>
+        </p:txBody>
+      </p:sp>
+      <p:sp>
+        <p:nvSpPr>
+          <p:cNvPr id="3" name="Content Placeholder 2">
+            <a:extLst>
+              <a:ext uri="{FF2B5EF4-FFF2-40B4-BE49-F238E27FC236}">
+                <a16:creationId xmlns:a16="http://schemas.microsoft.com/office/drawing/2014/main" id="{6B23FBB0-3F73-8646-83FC-C2FC364FEAF7}"/>
+              </a:ext>
+            </a:extLst>
+          </p:cNvPr>
+          <p:cNvSpPr>
+            <a:spLocks noGrp="1"/>
+          </p:cNvSpPr>
+          <p:nvPr>
+            <p:ph idx="1"/>
           </p:nvPr>
         </p:nvSpPr>
         <p:spPr/>
         <p:txBody>
-          <a:bodyPr/>
-          <a:lstStyle/>
-          <a:p>
-            <a:pPr>
-              <a:buFont typeface="Arial" charset="0"/>
+          <a:bodyPr>
+            <a:normAutofit fontScale="92500"/>
+          </a:bodyPr>
+          <a:lstStyle/>
+          <a:p>
+            <a:r>
+              <a:rPr lang="en-US" dirty="0"/>
+              <a:t>Q1: What is the relative error between n</a:t>
+            </a:r>
+            <a:r>
+              <a:rPr lang="en-US" baseline="30000" dirty="0"/>
+              <a:t>2</a:t>
+            </a:r>
+            <a:r>
+              <a:rPr lang="en-US" dirty="0"/>
+              <a:t> + 2n + 5 and an approximation n</a:t>
+            </a:r>
+            <a:r>
+              <a:rPr lang="en-US" baseline="30000" dirty="0"/>
+              <a:t>2</a:t>
+            </a:r>
+            <a:r>
+              <a:rPr lang="en-US" dirty="0"/>
+              <a:t> when n = 1000 and when n = 1000000? The relative error is the difference between the actual value and the approximation over the actual value.</a:t>
+            </a:r>
+          </a:p>
+          <a:p>
+            <a:r>
+              <a:rPr lang="en-US" dirty="0"/>
+              <a:t>Q2: Find the most appropriate representative element that describes each of the following rates of growth. For example, the most appropriate representative of 3n</a:t>
+            </a:r>
+            <a:r>
+              <a:rPr lang="en-US" baseline="30000" dirty="0"/>
+              <a:t>2</a:t>
+            </a:r>
+            <a:r>
+              <a:rPr lang="en-US" dirty="0"/>
+              <a:t> + 4n ln(n) + 5n + 2 is n</a:t>
+            </a:r>
+            <a:r>
+              <a:rPr lang="en-US" baseline="30000" dirty="0"/>
+              <a:t>2</a:t>
+            </a:r>
+          </a:p>
+          <a:p>
+            <a:pPr lvl="1"/>
+            <a:r>
+              <a:rPr lang="en-US" dirty="0"/>
+              <a:t>5n</a:t>
+            </a:r>
+            <a:r>
+              <a:rPr lang="en-US" baseline="30000" dirty="0"/>
+              <a:t>2</a:t>
+            </a:r>
+            <a:r>
+              <a:rPr lang="en-US" dirty="0"/>
+              <a:t> + 4n </a:t>
+            </a:r>
+            <a:r>
+              <a:rPr lang="en-US"/>
+              <a:t>+ 3n</a:t>
+            </a:r>
+            <a:r>
+              <a:rPr lang="en-US" baseline="30000"/>
+              <a:t>ln(</a:t>
+            </a:r>
+            <a:r>
+              <a:rPr lang="en-US" baseline="30000" dirty="0"/>
+              <a:t>6)</a:t>
+            </a:r>
+            <a:r>
+              <a:rPr lang="en-US" dirty="0"/>
+              <a:t> + 4 + ln(n)</a:t>
+            </a:r>
+          </a:p>
+          <a:p>
+            <a:pPr lvl="1"/>
+            <a:r>
+              <a:rPr lang="en-US" dirty="0"/>
+              <a:t>6n + 7 ln(n) + 8n ln(n) + 9</a:t>
+            </a:r>
+          </a:p>
+          <a:p>
+            <a:pPr lvl="1"/>
+            <a:r>
+              <a:rPr lang="en-US" dirty="0"/>
+              <a:t>4n</a:t>
+            </a:r>
+            <a:r>
+              <a:rPr lang="en-US" baseline="30000" dirty="0"/>
+              <a:t>3</a:t>
+            </a:r>
+            <a:r>
+              <a:rPr lang="en-US" dirty="0"/>
+              <a:t> + 7n + 514n</a:t>
+            </a:r>
+            <a:r>
+              <a:rPr lang="en-US" baseline="30000" dirty="0"/>
+              <a:t>4</a:t>
+            </a:r>
+            <a:r>
+              <a:rPr lang="en-US" dirty="0"/>
+              <a:t> + 35n</a:t>
+            </a:r>
+            <a:r>
+              <a:rPr lang="en-US" baseline="30000" dirty="0"/>
+              <a:t>2</a:t>
+            </a:r>
+            <a:r>
+              <a:rPr lang="en-US" dirty="0"/>
+              <a:t> + 2n</a:t>
+            </a:r>
+            <a:r>
+              <a:rPr lang="en-US" baseline="30000" dirty="0"/>
+              <a:t>6</a:t>
+            </a:r>
+            <a:r>
+              <a:rPr lang="en-US" dirty="0"/>
+              <a:t> + 5624</a:t>
+            </a:r>
+          </a:p>
+          <a:p>
+            <a:pPr lvl="1"/>
+            <a:r>
+              <a:rPr lang="en-US" dirty="0"/>
+              <a:t>10n + 11 ln(n) + 1 + 2n</a:t>
+            </a:r>
+            <a:r>
+              <a:rPr lang="en-US" baseline="30000" dirty="0"/>
+              <a:t>2</a:t>
+            </a:r>
+            <a:r>
+              <a:rPr lang="en-US" dirty="0"/>
+              <a:t> + 4n</a:t>
+            </a:r>
+            <a:r>
+              <a:rPr lang="en-US" baseline="30000" dirty="0"/>
+              <a:t>2</a:t>
+            </a:r>
+          </a:p>
+          <a:p>
+            <a:pPr marL="0" indent="0">
               <a:buNone/>
             </a:pPr>
             <a:r>
               <a:rPr lang="en-US" dirty="0">
-                <a:latin typeface="Arial" charset="0"/>
-                <a:cs typeface="Arial" charset="0"/>
-              </a:rPr>
-              <a:t>	In this class, we have:</a:t>
-            </a:r>
-          </a:p>
-          <a:p>
-            <a:pPr lvl="1"/>
-            <a:r>
-              <a:rPr lang="en-US" dirty="0">
-                <a:latin typeface="Arial" charset="0"/>
-                <a:cs typeface="Arial" charset="0"/>
-              </a:rPr>
-              <a:t>Introducing some new notations:  </a:t>
-            </a:r>
-            <a:r>
-              <a:rPr lang="en-US" dirty="0">
-                <a:latin typeface="Times New Roman" pitchFamily="18" charset="0"/>
-                <a:cs typeface="Arial" charset="0"/>
-              </a:rPr>
-              <a:t>o  O</a:t>
-            </a:r>
-            <a:r>
-              <a:rPr lang="en-US" dirty="0">
-                <a:latin typeface="Arial" charset="0"/>
-                <a:cs typeface="Arial" charset="0"/>
-              </a:rPr>
-              <a:t> </a:t>
-            </a:r>
-            <a:r>
-              <a:rPr lang="en-US" dirty="0">
-                <a:latin typeface="Symbol" pitchFamily="18" charset="2"/>
-                <a:cs typeface="Arial" charset="0"/>
-              </a:rPr>
-              <a:t> Q  W  w</a:t>
-            </a:r>
-            <a:endParaRPr lang="en-US" dirty="0">
-              <a:latin typeface="Arial" charset="0"/>
-              <a:cs typeface="Arial" charset="0"/>
-            </a:endParaRPr>
-          </a:p>
-          <a:p>
-            <a:pPr lvl="1"/>
-            <a:r>
-              <a:rPr lang="en-US" dirty="0">
-                <a:latin typeface="Arial" charset="0"/>
-                <a:cs typeface="Arial" charset="0"/>
-              </a:rPr>
-              <a:t>Discussed how to use these</a:t>
-            </a:r>
-          </a:p>
-          <a:p>
-            <a:pPr lvl="1"/>
-            <a:r>
-              <a:rPr lang="en-US" dirty="0">
-                <a:latin typeface="Arial" charset="0"/>
-                <a:cs typeface="Arial" charset="0"/>
-              </a:rPr>
-              <a:t>Looked at the equivalence relations</a:t>
+                <a:solidFill>
+                  <a:srgbClr val="FF0000"/>
+                </a:solidFill>
+              </a:rPr>
+              <a:t>Email your solution to </a:t>
+            </a:r>
+            <a:r>
+              <a:rPr lang="en-US" dirty="0">
+                <a:solidFill>
+                  <a:srgbClr val="FF0000"/>
+                </a:solidFill>
+                <a:hlinkClick r:id="rId2">
+                  <a:extLst>
+                    <a:ext uri="{A12FA001-AC4F-418D-AE19-62706E023703}">
+                      <ahyp:hlinkClr xmlns:ahyp="http://schemas.microsoft.com/office/drawing/2018/hyperlinkcolor" val="tx"/>
+                    </a:ext>
+                  </a:extLst>
+                </a:hlinkClick>
+              </a:rPr>
+              <a:t>tsung-wei.huang@utah.edu</a:t>
+            </a:r>
+            <a:r>
+              <a:rPr lang="en-US" dirty="0">
+                <a:solidFill>
+                  <a:srgbClr val="FF0000"/>
+                </a:solidFill>
+              </a:rPr>
+              <a:t> by 23:59 PM 9/22</a:t>
             </a:r>
           </a:p>
         </p:txBody>
       </p:sp>
     </p:spTree>
+    <p:extLst>
+      <p:ext uri="{BB962C8B-B14F-4D97-AF65-F5344CB8AC3E}">
+        <p14:creationId xmlns:p14="http://schemas.microsoft.com/office/powerpoint/2010/main" val="2220700341"/>
+      </p:ext>
+    </p:extLst>
   </p:cSld>
   <p:clrMapOvr>
     <a:masterClrMapping/>
@@ -16231,252 +16242,6 @@
         </p:txBody>
       </p:sp>
     </p:spTree>
-  </p:cSld>
-  <p:clrMapOvr>
-    <a:masterClrMapping/>
-  </p:clrMapOvr>
-</p:sld>
-</file>
-
-<file path=ppt/slides/slide40.xml><?xml version="1.0" encoding="utf-8"?>
-<p:sld xmlns:a="http://schemas.openxmlformats.org/drawingml/2006/main" xmlns:r="http://schemas.openxmlformats.org/officeDocument/2006/relationships" xmlns:p="http://schemas.openxmlformats.org/presentationml/2006/main">
-  <p:cSld>
-    <p:spTree>
-      <p:nvGrpSpPr>
-        <p:cNvPr id="1" name=""/>
-        <p:cNvGrpSpPr/>
-        <p:nvPr/>
-      </p:nvGrpSpPr>
-      <p:grpSpPr>
-        <a:xfrm>
-          <a:off x="0" y="0"/>
-          <a:ext cx="0" cy="0"/>
-          <a:chOff x="0" y="0"/>
-          <a:chExt cx="0" cy="0"/>
-        </a:xfrm>
-      </p:grpSpPr>
-      <p:sp>
-        <p:nvSpPr>
-          <p:cNvPr id="2" name="Title 1">
-            <a:extLst>
-              <a:ext uri="{FF2B5EF4-FFF2-40B4-BE49-F238E27FC236}">
-                <a16:creationId xmlns:a16="http://schemas.microsoft.com/office/drawing/2014/main" id="{ABD76339-190F-BE4C-A3F1-8DA98773FC23}"/>
-              </a:ext>
-            </a:extLst>
-          </p:cNvPr>
-          <p:cNvSpPr>
-            <a:spLocks noGrp="1"/>
-          </p:cNvSpPr>
-          <p:nvPr>
-            <p:ph type="title"/>
-          </p:nvPr>
-        </p:nvSpPr>
-        <p:spPr/>
-        <p:txBody>
-          <a:bodyPr/>
-          <a:lstStyle/>
-          <a:p>
-            <a:r>
-              <a:rPr lang="en-US" dirty="0"/>
-              <a:t>LAB 1</a:t>
-            </a:r>
-          </a:p>
-        </p:txBody>
-      </p:sp>
-      <p:sp>
-        <p:nvSpPr>
-          <p:cNvPr id="3" name="Content Placeholder 2">
-            <a:extLst>
-              <a:ext uri="{FF2B5EF4-FFF2-40B4-BE49-F238E27FC236}">
-                <a16:creationId xmlns:a16="http://schemas.microsoft.com/office/drawing/2014/main" id="{6B23FBB0-3F73-8646-83FC-C2FC364FEAF7}"/>
-              </a:ext>
-            </a:extLst>
-          </p:cNvPr>
-          <p:cNvSpPr>
-            <a:spLocks noGrp="1"/>
-          </p:cNvSpPr>
-          <p:nvPr>
-            <p:ph idx="1"/>
-          </p:nvPr>
-        </p:nvSpPr>
-        <p:spPr/>
-        <p:txBody>
-          <a:bodyPr>
-            <a:normAutofit fontScale="92500"/>
-          </a:bodyPr>
-          <a:lstStyle/>
-          <a:p>
-            <a:r>
-              <a:rPr lang="en-US" dirty="0"/>
-              <a:t>Q1: What is the relative error between n</a:t>
-            </a:r>
-            <a:r>
-              <a:rPr lang="en-US" baseline="30000" dirty="0"/>
-              <a:t>2</a:t>
-            </a:r>
-            <a:r>
-              <a:rPr lang="en-US" dirty="0"/>
-              <a:t> + 2n + 5 and an approximation n</a:t>
-            </a:r>
-            <a:r>
-              <a:rPr lang="en-US" baseline="30000" dirty="0"/>
-              <a:t>2</a:t>
-            </a:r>
-            <a:r>
-              <a:rPr lang="en-US" dirty="0"/>
-              <a:t> when n = 1000 and when n = 1000000? The relative error is the difference between the actual value and the approximation over the actual value.</a:t>
-            </a:r>
-          </a:p>
-          <a:p>
-            <a:r>
-              <a:rPr lang="en-US" dirty="0"/>
-              <a:t>Q2: Find the most appropriate representative element that describes each of the following rates of growth. For example, the most appropriate representative of 3n</a:t>
-            </a:r>
-            <a:r>
-              <a:rPr lang="en-US" baseline="30000" dirty="0"/>
-              <a:t>2</a:t>
-            </a:r>
-            <a:r>
-              <a:rPr lang="en-US" dirty="0"/>
-              <a:t> + 4n ln(n) + 5n + 2 is n</a:t>
-            </a:r>
-            <a:r>
-              <a:rPr lang="en-US" baseline="30000" dirty="0"/>
-              <a:t>2</a:t>
-            </a:r>
-          </a:p>
-          <a:p>
-            <a:pPr lvl="1"/>
-            <a:r>
-              <a:rPr lang="en-US" dirty="0"/>
-              <a:t>5n</a:t>
-            </a:r>
-            <a:r>
-              <a:rPr lang="en-US" baseline="30000" dirty="0"/>
-              <a:t>2</a:t>
-            </a:r>
-            <a:r>
-              <a:rPr lang="en-US" dirty="0"/>
-              <a:t> + 4n + 3n</a:t>
-            </a:r>
-            <a:r>
-              <a:rPr lang="en-US" baseline="30000" dirty="0"/>
-              <a:t>lg(6)</a:t>
-            </a:r>
-            <a:r>
-              <a:rPr lang="en-US" dirty="0"/>
-              <a:t> + 4 + ln(n)</a:t>
-            </a:r>
-          </a:p>
-          <a:p>
-            <a:pPr lvl="1"/>
-            <a:r>
-              <a:rPr lang="en-US" dirty="0"/>
-              <a:t>6n + 7 ln(n) + 8n ln(n) + 9</a:t>
-            </a:r>
-          </a:p>
-          <a:p>
-            <a:pPr lvl="1"/>
-            <a:r>
-              <a:rPr lang="en-US" dirty="0"/>
-              <a:t>4n</a:t>
-            </a:r>
-            <a:r>
-              <a:rPr lang="en-US" baseline="30000" dirty="0"/>
-              <a:t>3</a:t>
-            </a:r>
-            <a:r>
-              <a:rPr lang="en-US" dirty="0"/>
-              <a:t> + 7n + 514n</a:t>
-            </a:r>
-            <a:r>
-              <a:rPr lang="en-US" baseline="30000" dirty="0"/>
-              <a:t>4</a:t>
-            </a:r>
-            <a:r>
-              <a:rPr lang="en-US" dirty="0"/>
-              <a:t> + 35n</a:t>
-            </a:r>
-            <a:r>
-              <a:rPr lang="en-US" baseline="30000" dirty="0"/>
-              <a:t>2</a:t>
-            </a:r>
-            <a:r>
-              <a:rPr lang="en-US" dirty="0"/>
-              <a:t> + 2n</a:t>
-            </a:r>
-            <a:r>
-              <a:rPr lang="en-US" baseline="30000" dirty="0"/>
-              <a:t>6</a:t>
-            </a:r>
-            <a:r>
-              <a:rPr lang="en-US" dirty="0"/>
-              <a:t> + 5624</a:t>
-            </a:r>
-          </a:p>
-          <a:p>
-            <a:pPr lvl="1"/>
-            <a:r>
-              <a:rPr lang="en-US" dirty="0"/>
-              <a:t>10n + 11 ln(n) + 1 + 2n</a:t>
-            </a:r>
-            <a:r>
-              <a:rPr lang="en-US" baseline="30000" dirty="0"/>
-              <a:t>2</a:t>
-            </a:r>
-            <a:r>
-              <a:rPr lang="en-US" dirty="0"/>
-              <a:t> + 4n</a:t>
-            </a:r>
-            <a:r>
-              <a:rPr lang="en-US" baseline="30000" dirty="0"/>
-              <a:t>2</a:t>
-            </a:r>
-          </a:p>
-          <a:p>
-            <a:pPr marL="0" indent="0">
-              <a:buNone/>
-            </a:pPr>
-            <a:r>
-              <a:rPr lang="en-US" dirty="0">
-                <a:solidFill>
-                  <a:srgbClr val="FF0000"/>
-                </a:solidFill>
-              </a:rPr>
-              <a:t>Email your solution to </a:t>
-            </a:r>
-            <a:r>
-              <a:rPr lang="en-US" dirty="0">
-                <a:solidFill>
-                  <a:srgbClr val="FF0000"/>
-                </a:solidFill>
-                <a:hlinkClick r:id="rId2">
-                  <a:extLst>
-                    <a:ext uri="{A12FA001-AC4F-418D-AE19-62706E023703}">
-                      <ahyp:hlinkClr xmlns:ahyp="http://schemas.microsoft.com/office/drawing/2018/hyperlinkcolor" val="tx"/>
-                    </a:ext>
-                  </a:extLst>
-                </a:hlinkClick>
-              </a:rPr>
-              <a:t>tsung-wei.huang@utah.edu</a:t>
-            </a:r>
-            <a:r>
-              <a:rPr lang="en-US" dirty="0">
-                <a:solidFill>
-                  <a:srgbClr val="FF0000"/>
-                </a:solidFill>
-              </a:rPr>
-              <a:t> by 23:59 PM 9/22</a:t>
-            </a:r>
-          </a:p>
-        </p:txBody>
-      </p:sp>
-    </p:spTree>
-    <p:extLst>
-      <p:ext uri="{BB962C8B-B14F-4D97-AF65-F5344CB8AC3E}">
-        <p14:creationId xmlns:p14="http://schemas.microsoft.com/office/powerpoint/2010/main" val="2220700341"/>
-      </p:ext>
-    </p:extLst>
   </p:cSld>
   <p:clrMapOvr>
     <a:masterClrMapping/>

</xml_diff>